<commit_message>
repository copied into organization
</commit_message>
<xml_diff>
--- a/Versionsmanagement_Präsentation.pptx
+++ b/Versionsmanagement_Präsentation.pptx
@@ -5,10 +5,10 @@
     <p:sldMasterId id="2147483660" r:id="rId2"/>
   </p:sldMasterIdLst>
   <p:notesMasterIdLst>
-    <p:notesMasterId r:id="rId19"/>
+    <p:notesMasterId r:id="rId22"/>
   </p:notesMasterIdLst>
   <p:handoutMasterIdLst>
-    <p:handoutMasterId r:id="rId20"/>
+    <p:handoutMasterId r:id="rId23"/>
   </p:handoutMasterIdLst>
   <p:sldIdLst>
     <p:sldId id="257" r:id="rId3"/>
@@ -21,12 +21,15 @@
     <p:sldId id="294" r:id="rId10"/>
     <p:sldId id="295" r:id="rId11"/>
     <p:sldId id="290" r:id="rId12"/>
-    <p:sldId id="292" r:id="rId13"/>
-    <p:sldId id="296" r:id="rId14"/>
-    <p:sldId id="278" r:id="rId15"/>
-    <p:sldId id="287" r:id="rId16"/>
-    <p:sldId id="274" r:id="rId17"/>
-    <p:sldId id="288" r:id="rId18"/>
+    <p:sldId id="297" r:id="rId13"/>
+    <p:sldId id="292" r:id="rId14"/>
+    <p:sldId id="296" r:id="rId15"/>
+    <p:sldId id="298" r:id="rId16"/>
+    <p:sldId id="299" r:id="rId17"/>
+    <p:sldId id="278" r:id="rId18"/>
+    <p:sldId id="287" r:id="rId19"/>
+    <p:sldId id="274" r:id="rId20"/>
+    <p:sldId id="288" r:id="rId21"/>
   </p:sldIdLst>
   <p:sldSz cx="12188825" cy="6858000"/>
   <p:notesSz cx="6858000" cy="9144000"/>
@@ -265,7 +268,7 @@
           <a:p>
             <a:fld id="{FE5B4EDC-59C0-49C7-8ADA-5A781B329E02}" type="datetimeFigureOut">
               <a:rPr lang="de-DE"/>
-              <a:t>13.12.2016</a:t>
+              <a:t>15.12.2016</a:t>
             </a:fld>
             <a:endParaRPr/>
           </a:p>
@@ -430,7 +433,7 @@
           <a:p>
             <a:fld id="{F2D8D46A-B586-417D-BFBD-8C8FE0AAF762}" type="datetimeFigureOut">
               <a:rPr lang="de-DE"/>
-              <a:t>13.12.2016</a:t>
+              <a:t>15.12.2016</a:t>
             </a:fld>
             <a:endParaRPr/>
           </a:p>
@@ -1453,7 +1456,7 @@
           <a:p>
             <a:fld id="{F0DFD029-FB74-4578-B929-F66AA97659CA}" type="datetimeFigureOut">
               <a:rPr lang="de-DE" noProof="0" smtClean="0"/>
-              <a:t>13.12.2016</a:t>
+              <a:t>15.12.2016</a:t>
             </a:fld>
             <a:endParaRPr lang="de-DE" noProof="0" dirty="0"/>
           </a:p>
@@ -1651,7 +1654,7 @@
           <a:p>
             <a:fld id="{F0DFD029-FB74-4578-B929-F66AA97659CA}" type="datetimeFigureOut">
               <a:rPr lang="de-DE" noProof="0" smtClean="0"/>
-              <a:t>13.12.2016</a:t>
+              <a:t>15.12.2016</a:t>
             </a:fld>
             <a:endParaRPr lang="de-DE" noProof="0" dirty="0"/>
           </a:p>
@@ -1859,7 +1862,7 @@
           <a:p>
             <a:fld id="{F0DFD029-FB74-4578-B929-F66AA97659CA}" type="datetimeFigureOut">
               <a:rPr lang="de-DE" noProof="0" smtClean="0"/>
-              <a:t>13.12.2016</a:t>
+              <a:t>15.12.2016</a:t>
             </a:fld>
             <a:endParaRPr lang="de-DE" noProof="0" dirty="0"/>
           </a:p>
@@ -2057,7 +2060,7 @@
           <a:p>
             <a:fld id="{F0DFD029-FB74-4578-B929-F66AA97659CA}" type="datetimeFigureOut">
               <a:rPr lang="de-DE" noProof="0" smtClean="0"/>
-              <a:t>13.12.2016</a:t>
+              <a:t>15.12.2016</a:t>
             </a:fld>
             <a:endParaRPr lang="de-DE" noProof="0" dirty="0"/>
           </a:p>
@@ -2320,7 +2323,7 @@
           <a:p>
             <a:fld id="{F0DFD029-FB74-4578-B929-F66AA97659CA}" type="datetimeFigureOut">
               <a:rPr lang="de-DE" noProof="0" smtClean="0"/>
-              <a:t>13.12.2016</a:t>
+              <a:t>15.12.2016</a:t>
             </a:fld>
             <a:endParaRPr lang="de-DE" noProof="0" dirty="0"/>
           </a:p>
@@ -2798,7 +2801,7 @@
           <a:p>
             <a:fld id="{F0DFD029-FB74-4578-B929-F66AA97659CA}" type="datetimeFigureOut">
               <a:rPr lang="de-DE" noProof="0" smtClean="0"/>
-              <a:t>13.12.2016</a:t>
+              <a:t>15.12.2016</a:t>
             </a:fld>
             <a:endParaRPr lang="de-DE" noProof="0" dirty="0"/>
           </a:p>
@@ -3259,7 +3262,7 @@
           <a:p>
             <a:fld id="{F0DFD029-FB74-4578-B929-F66AA97659CA}" type="datetimeFigureOut">
               <a:rPr lang="de-DE" noProof="0" smtClean="0"/>
-              <a:t>13.12.2016</a:t>
+              <a:t>15.12.2016</a:t>
             </a:fld>
             <a:endParaRPr lang="de-DE" noProof="0" dirty="0"/>
           </a:p>
@@ -3389,7 +3392,7 @@
           <a:p>
             <a:fld id="{F0DFD029-FB74-4578-B929-F66AA97659CA}" type="datetimeFigureOut">
               <a:rPr lang="de-DE" noProof="0" smtClean="0"/>
-              <a:t>13.12.2016</a:t>
+              <a:t>15.12.2016</a:t>
             </a:fld>
             <a:endParaRPr lang="de-DE" noProof="0" dirty="0"/>
           </a:p>
@@ -3496,7 +3499,7 @@
           <a:p>
             <a:fld id="{F0DFD029-FB74-4578-B929-F66AA97659CA}" type="datetimeFigureOut">
               <a:rPr lang="de-DE" noProof="0" smtClean="0"/>
-              <a:t>13.12.2016</a:t>
+              <a:t>15.12.2016</a:t>
             </a:fld>
             <a:endParaRPr lang="de-DE" noProof="0" dirty="0"/>
           </a:p>
@@ -3795,7 +3798,7 @@
           <a:p>
             <a:fld id="{F0DFD029-FB74-4578-B929-F66AA97659CA}" type="datetimeFigureOut">
               <a:rPr lang="de-DE" noProof="0" smtClean="0"/>
-              <a:t>13.12.2016</a:t>
+              <a:t>15.12.2016</a:t>
             </a:fld>
             <a:endParaRPr lang="de-DE" noProof="0" dirty="0"/>
           </a:p>
@@ -4083,7 +4086,7 @@
           <a:p>
             <a:fld id="{F0DFD029-FB74-4578-B929-F66AA97659CA}" type="datetimeFigureOut">
               <a:rPr lang="de-DE" noProof="0" smtClean="0"/>
-              <a:t>13.12.2016</a:t>
+              <a:t>15.12.2016</a:t>
             </a:fld>
             <a:endParaRPr lang="de-DE" noProof="0" dirty="0"/>
           </a:p>
@@ -4704,7 +4707,7 @@
             <a:fld id="{F0DFD029-FB74-4578-B929-F66AA97659CA}" type="datetimeFigureOut">
               <a:rPr lang="de-DE" noProof="0" smtClean="0"/>
               <a:pPr/>
-              <a:t>13.12.2016</a:t>
+              <a:t>15.12.2016</a:t>
             </a:fld>
             <a:endParaRPr lang="de-DE" noProof="0" dirty="0"/>
           </a:p>
@@ -5420,13 +5423,17 @@
         </p:spPr>
         <p:txBody>
           <a:bodyPr>
-            <a:normAutofit fontScale="70000" lnSpcReduction="20000"/>
+            <a:normAutofit lnSpcReduction="10000"/>
           </a:bodyPr>
           <a:lstStyle/>
           <a:p>
             <a:r>
+              <a:rPr lang="de-DE" dirty="0"/>
+              <a:t>Allgemeine </a:t>
+            </a:r>
+            <a:r>
               <a:rPr lang="de-DE" dirty="0" err="1"/>
-              <a:t>repositories</a:t>
+              <a:t>möglichkeiten</a:t>
             </a:r>
             <a:endParaRPr lang="de-DE" dirty="0"/>
           </a:p>
@@ -5435,20 +5442,17 @@
           </a:p>
           <a:p>
             <a:r>
+              <a:rPr lang="de-DE" dirty="0"/>
+              <a:t>Beispiel mit </a:t>
+            </a:r>
+            <a:r>
               <a:rPr lang="de-DE" dirty="0" err="1"/>
-              <a:t>organisationen</a:t>
-            </a:r>
-            <a:endParaRPr lang="de-DE" dirty="0"/>
-          </a:p>
-          <a:p>
-            <a:endParaRPr lang="de-DE" dirty="0"/>
-          </a:p>
-          <a:p>
-            <a:r>
-              <a:rPr lang="de-DE" dirty="0" err="1"/>
-              <a:t>berechtigungen</a:t>
-            </a:r>
-            <a:endParaRPr lang="de-DE" dirty="0"/>
+              <a:t>android</a:t>
+            </a:r>
+            <a:r>
+              <a:rPr lang="de-DE" dirty="0"/>
+              <a:t>-studio</a:t>
+            </a:r>
           </a:p>
           <a:p>
             <a:endParaRPr lang="de-DE" dirty="0"/>
@@ -5502,7 +5506,7 @@
       </p:grpSpPr>
       <p:sp>
         <p:nvSpPr>
-          <p:cNvPr id="2" name="Titel 1"/>
+          <p:cNvPr id="4" name="Titel 3"/>
           <p:cNvSpPr>
             <a:spLocks noGrp="1"/>
           </p:cNvSpPr>
@@ -5522,51 +5526,40 @@
           </a:p>
         </p:txBody>
       </p:sp>
-      <p:sp>
-        <p:nvSpPr>
-          <p:cNvPr id="3" name="Inhaltsplatzhalter 2"/>
-          <p:cNvSpPr>
-            <a:spLocks noGrp="1"/>
-          </p:cNvSpPr>
-          <p:nvPr>
-            <p:ph idx="1"/>
-          </p:nvPr>
-        </p:nvSpPr>
+      <p:pic>
+        <p:nvPicPr>
+          <p:cNvPr id="2" name="Grafik 1"/>
+          <p:cNvPicPr>
+            <a:picLocks noChangeAspect="1"/>
+          </p:cNvPicPr>
+          <p:nvPr/>
+        </p:nvPicPr>
+        <p:blipFill>
+          <a:blip r:embed="rId2">
+            <a:extLst>
+              <a:ext uri="{28A0092B-C50C-407E-A947-70E740481C1C}">
+                <a14:useLocalDpi xmlns:a14="http://schemas.microsoft.com/office/drawing/2010/main" val="0"/>
+              </a:ext>
+            </a:extLst>
+          </a:blip>
+          <a:stretch>
+            <a:fillRect/>
+          </a:stretch>
+        </p:blipFill>
         <p:spPr>
           <a:xfrm>
-            <a:off x="1218882" y="1844824"/>
-            <a:ext cx="10360501" cy="4462272"/>
+            <a:off x="7390556" y="400277"/>
+            <a:ext cx="4114286" cy="3619047"/>
           </a:xfrm>
+          <a:prstGeom prst="rect">
+            <a:avLst/>
+          </a:prstGeom>
         </p:spPr>
-        <p:txBody>
-          <a:bodyPr>
-            <a:normAutofit/>
-          </a:bodyPr>
-          <a:lstStyle/>
-          <a:p>
-            <a:endParaRPr lang="de-DE" dirty="0"/>
-          </a:p>
-          <a:p>
-            <a:r>
-              <a:rPr lang="de-DE" dirty="0"/>
-              <a:t>SVN: Apache Subversion</a:t>
-            </a:r>
-          </a:p>
-          <a:p>
-            <a:endParaRPr lang="de-DE" dirty="0"/>
-          </a:p>
-          <a:p>
-            <a:r>
-              <a:rPr lang="de-DE" dirty="0"/>
-              <a:t>Client-Server-Struktur</a:t>
-            </a:r>
-          </a:p>
-        </p:txBody>
-      </p:sp>
+      </p:pic>
     </p:spTree>
     <p:extLst>
       <p:ext uri="{BB962C8B-B14F-4D97-AF65-F5344CB8AC3E}">
-        <p14:creationId xmlns:p14="http://schemas.microsoft.com/office/powerpoint/2010/main" val="2243623916"/>
+        <p14:creationId xmlns:p14="http://schemas.microsoft.com/office/powerpoint/2010/main" val="2091333564"/>
       </p:ext>
     </p:extLst>
   </p:cSld>
@@ -5627,10 +5620,101 @@
           </a:p>
         </p:txBody>
       </p:sp>
+      <p:sp>
+        <p:nvSpPr>
+          <p:cNvPr id="3" name="Inhaltsplatzhalter 2"/>
+          <p:cNvSpPr>
+            <a:spLocks noGrp="1"/>
+          </p:cNvSpPr>
+          <p:nvPr>
+            <p:ph idx="1"/>
+          </p:nvPr>
+        </p:nvSpPr>
+        <p:spPr>
+          <a:xfrm>
+            <a:off x="1218882" y="1844824"/>
+            <a:ext cx="10360501" cy="4462272"/>
+          </a:xfrm>
+        </p:spPr>
+        <p:txBody>
+          <a:bodyPr>
+            <a:normAutofit fontScale="92500" lnSpcReduction="10000"/>
+          </a:bodyPr>
+          <a:lstStyle/>
+          <a:p>
+            <a:endParaRPr lang="de-DE" dirty="0"/>
+          </a:p>
+          <a:p>
+            <a:r>
+              <a:rPr lang="de-DE" dirty="0"/>
+              <a:t>SVN: Apache Subversion</a:t>
+            </a:r>
+          </a:p>
+          <a:p>
+            <a:endParaRPr lang="de-DE" dirty="0"/>
+          </a:p>
+          <a:p>
+            <a:r>
+              <a:rPr lang="de-DE" dirty="0"/>
+              <a:t>Online per URL</a:t>
+            </a:r>
+          </a:p>
+          <a:p>
+            <a:r>
+              <a:rPr lang="de-DE" dirty="0"/>
+              <a:t>Per Verzeichnisse auf Computer</a:t>
+            </a:r>
+          </a:p>
+          <a:p>
+            <a:endParaRPr lang="de-DE" dirty="0"/>
+          </a:p>
+          <a:p>
+            <a:r>
+              <a:rPr lang="de-DE" dirty="0"/>
+              <a:t>Client-Server-Struktur</a:t>
+            </a:r>
+          </a:p>
+          <a:p>
+            <a:pPr lvl="1"/>
+            <a:r>
+              <a:rPr lang="de-DE" dirty="0"/>
+              <a:t>Aufbau eines Servers mit </a:t>
+            </a:r>
+            <a:r>
+              <a:rPr lang="de-DE" dirty="0" err="1"/>
+              <a:t>VisualSVN</a:t>
+            </a:r>
+            <a:r>
+              <a:rPr lang="de-DE" dirty="0"/>
+              <a:t> Server </a:t>
+            </a:r>
+          </a:p>
+          <a:p>
+            <a:pPr lvl="1"/>
+            <a:r>
+              <a:rPr lang="de-DE" dirty="0"/>
+              <a:t>URL-Erzeugung z.B. </a:t>
+            </a:r>
+            <a:r>
+              <a:rPr lang="de-DE" sz="1800" u="sng" dirty="0">
+                <a:hlinkClick r:id="rId2"/>
+              </a:rPr>
+              <a:t>https://DESKTOP-9MVMFJ3/svn/Test_Repository</a:t>
+            </a:r>
+            <a:endParaRPr lang="de-DE" sz="1800" u="sng" dirty="0"/>
+          </a:p>
+          <a:p>
+            <a:pPr marL="377886" lvl="1" indent="0">
+              <a:buNone/>
+            </a:pPr>
+            <a:endParaRPr lang="de-DE" sz="1800" u="sng" dirty="0"/>
+          </a:p>
+        </p:txBody>
+      </p:sp>
     </p:spTree>
     <p:extLst>
       <p:ext uri="{BB962C8B-B14F-4D97-AF65-F5344CB8AC3E}">
-        <p14:creationId xmlns:p14="http://schemas.microsoft.com/office/powerpoint/2010/main" val="1137022753"/>
+        <p14:creationId xmlns:p14="http://schemas.microsoft.com/office/powerpoint/2010/main" val="2243623916"/>
       </p:ext>
     </p:extLst>
   </p:cSld>
@@ -5671,7 +5755,7 @@
       </p:grpSpPr>
       <p:sp>
         <p:nvSpPr>
-          <p:cNvPr id="7" name="Titel 6"/>
+          <p:cNvPr id="2" name="Titel 1"/>
           <p:cNvSpPr>
             <a:spLocks noGrp="1"/>
           </p:cNvSpPr>
@@ -5679,129 +5763,213 @@
             <p:ph type="title"/>
           </p:nvPr>
         </p:nvSpPr>
-        <p:spPr/>
+        <p:spPr>
+          <a:xfrm>
+            <a:off x="837828" y="301033"/>
+            <a:ext cx="10360501" cy="733896"/>
+          </a:xfrm>
+        </p:spPr>
         <p:txBody>
           <a:bodyPr/>
           <a:lstStyle/>
           <a:p>
             <a:r>
               <a:rPr lang="de-DE" dirty="0"/>
-              <a:t>Unterschiede der Tools</a:t>
-            </a:r>
-          </a:p>
-        </p:txBody>
-      </p:sp>
-      <p:sp>
-        <p:nvSpPr>
-          <p:cNvPr id="8" name="Textplatzhalter 7"/>
-          <p:cNvSpPr>
-            <a:spLocks noGrp="1"/>
-          </p:cNvSpPr>
-          <p:nvPr>
-            <p:ph type="body" idx="1"/>
-          </p:nvPr>
-        </p:nvSpPr>
-        <p:spPr/>
-        <p:txBody>
-          <a:bodyPr/>
-          <a:lstStyle/>
-          <a:p>
-            <a:pPr algn="ctr"/>
-            <a:r>
-              <a:rPr lang="de-DE" dirty="0"/>
-              <a:t>GitHub</a:t>
-            </a:r>
-          </a:p>
-        </p:txBody>
-      </p:sp>
-      <p:sp>
-        <p:nvSpPr>
-          <p:cNvPr id="9" name="Textplatzhalter 8"/>
-          <p:cNvSpPr>
-            <a:spLocks noGrp="1"/>
-          </p:cNvSpPr>
-          <p:nvPr>
-            <p:ph type="body" sz="quarter" idx="3"/>
-          </p:nvPr>
-        </p:nvSpPr>
-        <p:spPr/>
-        <p:txBody>
-          <a:bodyPr/>
-          <a:lstStyle/>
-          <a:p>
-            <a:pPr algn="ctr"/>
-            <a:r>
-              <a:rPr lang="de-DE" dirty="0"/>
-              <a:t>SVN</a:t>
-            </a:r>
-          </a:p>
-        </p:txBody>
-      </p:sp>
-      <p:sp>
-        <p:nvSpPr>
-          <p:cNvPr id="10" name="Inhaltsplatzhalter 9"/>
-          <p:cNvSpPr>
-            <a:spLocks noGrp="1"/>
-          </p:cNvSpPr>
-          <p:nvPr>
-            <p:ph sz="half" idx="2"/>
-          </p:nvPr>
-        </p:nvSpPr>
+              <a:t>Kurzeinführung SVN</a:t>
+            </a:r>
+          </a:p>
+        </p:txBody>
+      </p:sp>
+      <p:pic>
+        <p:nvPicPr>
+          <p:cNvPr id="6" name="Grafik 5"/>
+          <p:cNvPicPr>
+            <a:picLocks noChangeAspect="1"/>
+          </p:cNvPicPr>
+          <p:nvPr/>
+        </p:nvPicPr>
+        <p:blipFill>
+          <a:blip r:embed="rId2">
+            <a:extLst>
+              <a:ext uri="{28A0092B-C50C-407E-A947-70E740481C1C}">
+                <a14:useLocalDpi xmlns:a14="http://schemas.microsoft.com/office/drawing/2010/main" val="0"/>
+              </a:ext>
+            </a:extLst>
+          </a:blip>
+          <a:stretch>
+            <a:fillRect/>
+          </a:stretch>
+        </p:blipFill>
         <p:spPr>
           <a:xfrm>
-            <a:off x="1218883" y="2717800"/>
-            <a:ext cx="5082740" cy="3454400"/>
+            <a:off x="4942284" y="1124744"/>
+            <a:ext cx="7139808" cy="4503803"/>
           </a:xfrm>
+          <a:prstGeom prst="rect">
+            <a:avLst/>
+          </a:prstGeom>
         </p:spPr>
-        <p:txBody>
-          <a:bodyPr/>
-          <a:lstStyle/>
-          <a:p>
-            <a:r>
-              <a:rPr lang="de-DE" sz="1800" dirty="0"/>
-              <a:t>Unterschied 1</a:t>
-            </a:r>
-          </a:p>
-          <a:p>
-            <a:r>
-              <a:rPr lang="de-DE" sz="1800" dirty="0"/>
-              <a:t>Unterschied 2</a:t>
-            </a:r>
-          </a:p>
-          <a:p>
-            <a:endParaRPr lang="de-DE" dirty="0"/>
-          </a:p>
-        </p:txBody>
-      </p:sp>
-      <p:sp>
-        <p:nvSpPr>
-          <p:cNvPr id="11" name="Inhaltsplatzhalter 10"/>
-          <p:cNvSpPr>
-            <a:spLocks noGrp="1"/>
-          </p:cNvSpPr>
-          <p:nvPr>
-            <p:ph sz="quarter" idx="4"/>
-          </p:nvPr>
-        </p:nvSpPr>
+      </p:pic>
+      <p:pic>
+        <p:nvPicPr>
+          <p:cNvPr id="5" name="Grafik 4"/>
+          <p:cNvPicPr>
+            <a:picLocks noChangeAspect="1"/>
+          </p:cNvPicPr>
+          <p:nvPr/>
+        </p:nvPicPr>
+        <p:blipFill>
+          <a:blip r:embed="rId3">
+            <a:extLst>
+              <a:ext uri="{28A0092B-C50C-407E-A947-70E740481C1C}">
+                <a14:useLocalDpi xmlns:a14="http://schemas.microsoft.com/office/drawing/2010/main" val="0"/>
+              </a:ext>
+            </a:extLst>
+          </a:blip>
+          <a:stretch>
+            <a:fillRect/>
+          </a:stretch>
+        </p:blipFill>
         <p:spPr>
           <a:xfrm>
-            <a:off x="6500707" y="2717800"/>
-            <a:ext cx="5078677" cy="3454400"/>
+            <a:off x="549796" y="4077072"/>
+            <a:ext cx="6544588" cy="2591162"/>
           </a:xfrm>
+          <a:prstGeom prst="rect">
+            <a:avLst/>
+          </a:prstGeom>
         </p:spPr>
-        <p:txBody>
-          <a:bodyPr/>
+      </p:pic>
+      <p:sp>
+        <p:nvSpPr>
+          <p:cNvPr id="7" name="Textfeld 6"/>
+          <p:cNvSpPr txBox="1"/>
+          <p:nvPr/>
+        </p:nvSpPr>
+        <p:spPr>
+          <a:xfrm>
+            <a:off x="1917948" y="1720585"/>
+            <a:ext cx="2304256" cy="523220"/>
+          </a:xfrm>
+          <a:prstGeom prst="rect">
+            <a:avLst/>
+          </a:prstGeom>
+          <a:noFill/>
+        </p:spPr>
+        <p:txBody>
+          <a:bodyPr wrap="square" rtlCol="0">
+            <a:spAutoFit/>
+          </a:bodyPr>
           <a:lstStyle/>
           <a:p>
             <a:r>
-              <a:rPr lang="de-DE" sz="1800" dirty="0"/>
-              <a:t>Unterschied 1</a:t>
-            </a:r>
-          </a:p>
-          <a:p>
-            <a:r>
-              <a:rPr lang="de-DE" sz="1800" dirty="0"/>
-              <a:t>Unterschied 2</a:t>
+              <a:rPr lang="de-DE" sz="2800" dirty="0"/>
+              <a:t>Checkout-Box</a:t>
+            </a:r>
+          </a:p>
+        </p:txBody>
+      </p:sp>
+      <p:cxnSp>
+        <p:nvCxnSpPr>
+          <p:cNvPr id="9" name="Gerade Verbindung mit Pfeil 8"/>
+          <p:cNvCxnSpPr/>
+          <p:nvPr/>
+        </p:nvCxnSpPr>
+        <p:spPr>
+          <a:xfrm>
+            <a:off x="4222204" y="1982195"/>
+            <a:ext cx="648072" cy="0"/>
+          </a:xfrm>
+          <a:prstGeom prst="straightConnector1">
+            <a:avLst/>
+          </a:prstGeom>
+          <a:ln>
+            <a:solidFill>
+              <a:schemeClr val="tx1"/>
+            </a:solidFill>
+            <a:tailEnd type="triangle"/>
+          </a:ln>
+        </p:spPr>
+        <p:style>
+          <a:lnRef idx="3">
+            <a:schemeClr val="accent3"/>
+          </a:lnRef>
+          <a:fillRef idx="0">
+            <a:schemeClr val="accent3"/>
+          </a:fillRef>
+          <a:effectRef idx="2">
+            <a:schemeClr val="accent3"/>
+          </a:effectRef>
+          <a:fontRef idx="minor">
+            <a:schemeClr val="tx1"/>
+          </a:fontRef>
+        </p:style>
+      </p:cxnSp>
+      <p:cxnSp>
+        <p:nvCxnSpPr>
+          <p:cNvPr id="11" name="Gerade Verbindung mit Pfeil 10"/>
+          <p:cNvCxnSpPr/>
+          <p:nvPr/>
+        </p:nvCxnSpPr>
+        <p:spPr>
+          <a:xfrm flipH="1">
+            <a:off x="7318548" y="6165304"/>
+            <a:ext cx="616138" cy="0"/>
+          </a:xfrm>
+          <a:prstGeom prst="straightConnector1">
+            <a:avLst/>
+          </a:prstGeom>
+          <a:ln>
+            <a:solidFill>
+              <a:schemeClr val="tx1"/>
+            </a:solidFill>
+            <a:tailEnd type="triangle"/>
+          </a:ln>
+        </p:spPr>
+        <p:style>
+          <a:lnRef idx="3">
+            <a:schemeClr val="accent3"/>
+          </a:lnRef>
+          <a:fillRef idx="0">
+            <a:schemeClr val="accent3"/>
+          </a:fillRef>
+          <a:effectRef idx="2">
+            <a:schemeClr val="accent3"/>
+          </a:effectRef>
+          <a:fontRef idx="minor">
+            <a:schemeClr val="tx1"/>
+          </a:fontRef>
+        </p:style>
+      </p:cxnSp>
+      <p:sp>
+        <p:nvSpPr>
+          <p:cNvPr id="13" name="Textfeld 12"/>
+          <p:cNvSpPr txBox="1"/>
+          <p:nvPr/>
+        </p:nvSpPr>
+        <p:spPr>
+          <a:xfrm>
+            <a:off x="7934686" y="5903694"/>
+            <a:ext cx="3992374" cy="523220"/>
+          </a:xfrm>
+          <a:prstGeom prst="rect">
+            <a:avLst/>
+          </a:prstGeom>
+          <a:noFill/>
+        </p:spPr>
+        <p:txBody>
+          <a:bodyPr wrap="square" rtlCol="0">
+            <a:spAutoFit/>
+          </a:bodyPr>
+          <a:lstStyle/>
+          <a:p>
+            <a:r>
+              <a:rPr lang="de-DE" sz="2800" dirty="0" err="1"/>
+              <a:t>VisualSVN</a:t>
+            </a:r>
+            <a:r>
+              <a:rPr lang="de-DE" sz="2800" dirty="0"/>
+              <a:t> – Server</a:t>
             </a:r>
           </a:p>
         </p:txBody>
@@ -5809,7 +5977,7 @@
     </p:spTree>
     <p:extLst>
       <p:ext uri="{BB962C8B-B14F-4D97-AF65-F5344CB8AC3E}">
-        <p14:creationId xmlns:p14="http://schemas.microsoft.com/office/powerpoint/2010/main" val="1491371497"/>
+        <p14:creationId xmlns:p14="http://schemas.microsoft.com/office/powerpoint/2010/main" val="1137022753"/>
       </p:ext>
     </p:extLst>
   </p:cSld>
@@ -5850,7 +6018,7 @@
       </p:grpSpPr>
       <p:sp>
         <p:nvSpPr>
-          <p:cNvPr id="4" name="Titel 3"/>
+          <p:cNvPr id="2" name="Titel 1"/>
           <p:cNvSpPr>
             <a:spLocks noGrp="1"/>
           </p:cNvSpPr>
@@ -5858,60 +6026,63 @@
             <p:ph type="title"/>
           </p:nvPr>
         </p:nvSpPr>
-        <p:spPr/>
+        <p:spPr>
+          <a:xfrm>
+            <a:off x="837828" y="301033"/>
+            <a:ext cx="10360501" cy="733896"/>
+          </a:xfrm>
+        </p:spPr>
         <p:txBody>
           <a:bodyPr/>
           <a:lstStyle/>
           <a:p>
             <a:r>
               <a:rPr lang="de-DE" dirty="0"/>
-              <a:t>FAZIT</a:t>
-            </a:r>
-          </a:p>
-        </p:txBody>
-      </p:sp>
-      <p:sp>
-        <p:nvSpPr>
-          <p:cNvPr id="5" name="Textplatzhalter 4"/>
-          <p:cNvSpPr>
-            <a:spLocks noGrp="1"/>
-          </p:cNvSpPr>
-          <p:nvPr>
-            <p:ph type="body" idx="1"/>
-          </p:nvPr>
-        </p:nvSpPr>
-        <p:spPr/>
-        <p:txBody>
-          <a:bodyPr>
-            <a:normAutofit/>
-          </a:bodyPr>
-          <a:lstStyle/>
-          <a:p>
-            <a:r>
-              <a:rPr lang="de-DE" dirty="0"/>
-              <a:t>Welches </a:t>
-            </a:r>
-            <a:r>
-              <a:rPr lang="de-DE" dirty="0" err="1"/>
-              <a:t>tool</a:t>
-            </a:r>
-            <a:r>
-              <a:rPr lang="de-DE" dirty="0"/>
-              <a:t> ist besser</a:t>
-            </a:r>
-          </a:p>
-        </p:txBody>
-      </p:sp>
-      <p:sp>
-        <p:nvSpPr>
-          <p:cNvPr id="2" name="Textfeld 1"/>
+              <a:t>Kurzeinführung SVN</a:t>
+            </a:r>
+          </a:p>
+        </p:txBody>
+      </p:sp>
+      <p:pic>
+        <p:nvPicPr>
+          <p:cNvPr id="6" name="Grafik 5"/>
+          <p:cNvPicPr>
+            <a:picLocks noChangeAspect="1"/>
+          </p:cNvPicPr>
+          <p:nvPr/>
+        </p:nvPicPr>
+        <p:blipFill>
+          <a:blip r:embed="rId2">
+            <a:extLst>
+              <a:ext uri="{28A0092B-C50C-407E-A947-70E740481C1C}">
+                <a14:useLocalDpi xmlns:a14="http://schemas.microsoft.com/office/drawing/2010/main" val="0"/>
+              </a:ext>
+            </a:extLst>
+          </a:blip>
+          <a:stretch>
+            <a:fillRect/>
+          </a:stretch>
+        </p:blipFill>
+        <p:spPr>
+          <a:xfrm>
+            <a:off x="1773932" y="1196752"/>
+            <a:ext cx="9268881" cy="4778020"/>
+          </a:xfrm>
+          <a:prstGeom prst="rect">
+            <a:avLst/>
+          </a:prstGeom>
+        </p:spPr>
+      </p:pic>
+      <p:sp>
+        <p:nvSpPr>
+          <p:cNvPr id="7" name="Textfeld 6"/>
           <p:cNvSpPr txBox="1"/>
           <p:nvPr/>
         </p:nvSpPr>
         <p:spPr>
           <a:xfrm>
-            <a:off x="7174532" y="38809"/>
-            <a:ext cx="2664296" cy="5478423"/>
+            <a:off x="1924064" y="3585762"/>
+            <a:ext cx="2448272" cy="523220"/>
           </a:xfrm>
           <a:prstGeom prst="rect">
             <a:avLst/>
@@ -5925,10 +6096,135 @@
           <a:lstStyle/>
           <a:p>
             <a:r>
-              <a:rPr lang="de-DE" sz="35000">
-                <a:latin typeface="Century Schoolbook" panose="02040604050505020304" pitchFamily="18" charset="0"/>
-              </a:rPr>
-              <a:t>?</a:t>
+              <a:rPr lang="de-DE" sz="2800" dirty="0"/>
+              <a:t>User-Erstellung</a:t>
+            </a:r>
+          </a:p>
+        </p:txBody>
+      </p:sp>
+      <p:cxnSp>
+        <p:nvCxnSpPr>
+          <p:cNvPr id="9" name="Gerade Verbindung mit Pfeil 8"/>
+          <p:cNvCxnSpPr/>
+          <p:nvPr/>
+        </p:nvCxnSpPr>
+        <p:spPr>
+          <a:xfrm flipV="1">
+            <a:off x="3184549" y="2972756"/>
+            <a:ext cx="0" cy="613006"/>
+          </a:xfrm>
+          <a:prstGeom prst="straightConnector1">
+            <a:avLst/>
+          </a:prstGeom>
+          <a:ln>
+            <a:solidFill>
+              <a:schemeClr val="tx1"/>
+            </a:solidFill>
+            <a:tailEnd type="triangle"/>
+          </a:ln>
+        </p:spPr>
+        <p:style>
+          <a:lnRef idx="3">
+            <a:schemeClr val="accent3"/>
+          </a:lnRef>
+          <a:fillRef idx="0">
+            <a:schemeClr val="accent3"/>
+          </a:fillRef>
+          <a:effectRef idx="2">
+            <a:schemeClr val="accent3"/>
+          </a:effectRef>
+          <a:fontRef idx="minor">
+            <a:schemeClr val="tx1"/>
+          </a:fontRef>
+        </p:style>
+      </p:cxnSp>
+      <p:sp>
+        <p:nvSpPr>
+          <p:cNvPr id="12" name="Textfeld 11"/>
+          <p:cNvSpPr txBox="1"/>
+          <p:nvPr/>
+        </p:nvSpPr>
+        <p:spPr>
+          <a:xfrm>
+            <a:off x="2932176" y="4407659"/>
+            <a:ext cx="1619835" cy="954107"/>
+          </a:xfrm>
+          <a:prstGeom prst="rect">
+            <a:avLst/>
+          </a:prstGeom>
+          <a:noFill/>
+        </p:spPr>
+        <p:txBody>
+          <a:bodyPr wrap="square" rtlCol="0">
+            <a:spAutoFit/>
+          </a:bodyPr>
+          <a:lstStyle/>
+          <a:p>
+            <a:r>
+              <a:rPr lang="de-DE" sz="2800" dirty="0"/>
+              <a:t>Gruppen-Erstellung</a:t>
+            </a:r>
+          </a:p>
+        </p:txBody>
+      </p:sp>
+      <p:cxnSp>
+        <p:nvCxnSpPr>
+          <p:cNvPr id="10" name="Gerade Verbindung mit Pfeil 9"/>
+          <p:cNvCxnSpPr/>
+          <p:nvPr/>
+        </p:nvCxnSpPr>
+        <p:spPr>
+          <a:xfrm flipV="1">
+            <a:off x="4552011" y="4628939"/>
+            <a:ext cx="2268597" cy="255773"/>
+          </a:xfrm>
+          <a:prstGeom prst="straightConnector1">
+            <a:avLst/>
+          </a:prstGeom>
+          <a:ln>
+            <a:tailEnd type="triangle"/>
+          </a:ln>
+        </p:spPr>
+        <p:style>
+          <a:lnRef idx="3">
+            <a:schemeClr val="dk1"/>
+          </a:lnRef>
+          <a:fillRef idx="0">
+            <a:schemeClr val="dk1"/>
+          </a:fillRef>
+          <a:effectRef idx="2">
+            <a:schemeClr val="dk1"/>
+          </a:effectRef>
+          <a:fontRef idx="minor">
+            <a:schemeClr val="tx1"/>
+          </a:fontRef>
+        </p:style>
+      </p:cxnSp>
+      <p:sp>
+        <p:nvSpPr>
+          <p:cNvPr id="14" name="Textfeld 13"/>
+          <p:cNvSpPr txBox="1"/>
+          <p:nvPr/>
+        </p:nvSpPr>
+        <p:spPr>
+          <a:xfrm>
+            <a:off x="2277988" y="6165304"/>
+            <a:ext cx="8640960" cy="523220"/>
+          </a:xfrm>
+          <a:prstGeom prst="rect">
+            <a:avLst/>
+          </a:prstGeom>
+          <a:noFill/>
+        </p:spPr>
+        <p:txBody>
+          <a:bodyPr wrap="square" rtlCol="0">
+            <a:spAutoFit/>
+          </a:bodyPr>
+          <a:lstStyle/>
+          <a:p>
+            <a:r>
+              <a:rPr lang="de-DE" sz="2800" dirty="0"/>
+              <a:t>- Login per URL und user-profile</a:t>
             </a:r>
           </a:p>
         </p:txBody>
@@ -5936,7 +6232,7 @@
     </p:spTree>
     <p:extLst>
       <p:ext uri="{BB962C8B-B14F-4D97-AF65-F5344CB8AC3E}">
-        <p14:creationId xmlns:p14="http://schemas.microsoft.com/office/powerpoint/2010/main" val="1242439787"/>
+        <p14:creationId xmlns:p14="http://schemas.microsoft.com/office/powerpoint/2010/main" val="888254256"/>
       </p:ext>
     </p:extLst>
   </p:cSld>
@@ -5985,6 +6281,649 @@
             <p:ph type="title"/>
           </p:nvPr>
         </p:nvSpPr>
+        <p:spPr>
+          <a:xfrm>
+            <a:off x="837828" y="301033"/>
+            <a:ext cx="10360501" cy="733896"/>
+          </a:xfrm>
+        </p:spPr>
+        <p:txBody>
+          <a:bodyPr/>
+          <a:lstStyle/>
+          <a:p>
+            <a:r>
+              <a:rPr lang="de-DE" dirty="0"/>
+              <a:t>Kurzeinführung SVN</a:t>
+            </a:r>
+          </a:p>
+        </p:txBody>
+      </p:sp>
+      <p:sp>
+        <p:nvSpPr>
+          <p:cNvPr id="14" name="Textfeld 13"/>
+          <p:cNvSpPr txBox="1"/>
+          <p:nvPr/>
+        </p:nvSpPr>
+        <p:spPr>
+          <a:xfrm>
+            <a:off x="7361380" y="1062977"/>
+            <a:ext cx="4637688" cy="523220"/>
+          </a:xfrm>
+          <a:prstGeom prst="rect">
+            <a:avLst/>
+          </a:prstGeom>
+          <a:noFill/>
+        </p:spPr>
+        <p:txBody>
+          <a:bodyPr wrap="square" rtlCol="0">
+            <a:spAutoFit/>
+          </a:bodyPr>
+          <a:lstStyle/>
+          <a:p>
+            <a:r>
+              <a:rPr lang="de-DE" sz="2800" dirty="0"/>
+              <a:t>Login per URL und user-profile</a:t>
+            </a:r>
+          </a:p>
+        </p:txBody>
+      </p:sp>
+      <p:pic>
+        <p:nvPicPr>
+          <p:cNvPr id="3" name="Grafik 2"/>
+          <p:cNvPicPr>
+            <a:picLocks noChangeAspect="1"/>
+          </p:cNvPicPr>
+          <p:nvPr/>
+        </p:nvPicPr>
+        <p:blipFill rotWithShape="1">
+          <a:blip r:embed="rId2">
+            <a:extLst>
+              <a:ext uri="{28A0092B-C50C-407E-A947-70E740481C1C}">
+                <a14:useLocalDpi xmlns:a14="http://schemas.microsoft.com/office/drawing/2010/main" val="0"/>
+              </a:ext>
+            </a:extLst>
+          </a:blip>
+          <a:srcRect b="55250"/>
+          <a:stretch/>
+        </p:blipFill>
+        <p:spPr>
+          <a:xfrm>
+            <a:off x="981844" y="1062977"/>
+            <a:ext cx="6379536" cy="3068960"/>
+          </a:xfrm>
+          <a:prstGeom prst="rect">
+            <a:avLst/>
+          </a:prstGeom>
+        </p:spPr>
+      </p:pic>
+      <p:cxnSp>
+        <p:nvCxnSpPr>
+          <p:cNvPr id="5" name="Verbinder: gewinkelt 4"/>
+          <p:cNvCxnSpPr/>
+          <p:nvPr/>
+        </p:nvCxnSpPr>
+        <p:spPr>
+          <a:xfrm rot="10800000" flipV="1">
+            <a:off x="7462564" y="1614244"/>
+            <a:ext cx="1296144" cy="1166683"/>
+          </a:xfrm>
+          <a:prstGeom prst="bentConnector3">
+            <a:avLst>
+              <a:gd name="adj1" fmla="val 1601"/>
+            </a:avLst>
+          </a:prstGeom>
+          <a:ln>
+            <a:solidFill>
+              <a:schemeClr val="tx1"/>
+            </a:solidFill>
+            <a:tailEnd type="triangle"/>
+          </a:ln>
+        </p:spPr>
+        <p:style>
+          <a:lnRef idx="3">
+            <a:schemeClr val="accent1"/>
+          </a:lnRef>
+          <a:fillRef idx="0">
+            <a:schemeClr val="accent1"/>
+          </a:fillRef>
+          <a:effectRef idx="2">
+            <a:schemeClr val="accent1"/>
+          </a:effectRef>
+          <a:fontRef idx="minor">
+            <a:schemeClr val="tx1"/>
+          </a:fontRef>
+        </p:style>
+      </p:cxnSp>
+      <p:pic>
+        <p:nvPicPr>
+          <p:cNvPr id="15" name="Grafik 14"/>
+          <p:cNvPicPr>
+            <a:picLocks noChangeAspect="1"/>
+          </p:cNvPicPr>
+          <p:nvPr/>
+        </p:nvPicPr>
+        <p:blipFill>
+          <a:blip r:embed="rId3">
+            <a:extLst>
+              <a:ext uri="{28A0092B-C50C-407E-A947-70E740481C1C}">
+                <a14:useLocalDpi xmlns:a14="http://schemas.microsoft.com/office/drawing/2010/main" val="0"/>
+              </a:ext>
+            </a:extLst>
+          </a:blip>
+          <a:stretch>
+            <a:fillRect/>
+          </a:stretch>
+        </p:blipFill>
+        <p:spPr>
+          <a:xfrm>
+            <a:off x="3774300" y="3933056"/>
+            <a:ext cx="8241683" cy="2794323"/>
+          </a:xfrm>
+          <a:prstGeom prst="rect">
+            <a:avLst/>
+          </a:prstGeom>
+          <a:ln w="127000" cap="sq">
+            <a:solidFill>
+              <a:srgbClr val="000000"/>
+            </a:solidFill>
+            <a:miter lim="800000"/>
+          </a:ln>
+          <a:effectLst>
+            <a:outerShdw blurRad="57150" dist="50800" dir="2700000" algn="tl" rotWithShape="0">
+              <a:srgbClr val="000000">
+                <a:alpha val="40000"/>
+              </a:srgbClr>
+            </a:outerShdw>
+          </a:effectLst>
+        </p:spPr>
+      </p:pic>
+      <p:sp>
+        <p:nvSpPr>
+          <p:cNvPr id="16" name="Textfeld 15"/>
+          <p:cNvSpPr txBox="1"/>
+          <p:nvPr/>
+        </p:nvSpPr>
+        <p:spPr>
+          <a:xfrm>
+            <a:off x="29678" y="5084178"/>
+            <a:ext cx="3312368" cy="830997"/>
+          </a:xfrm>
+          <a:prstGeom prst="rect">
+            <a:avLst/>
+          </a:prstGeom>
+          <a:noFill/>
+        </p:spPr>
+        <p:txBody>
+          <a:bodyPr wrap="square" rtlCol="0">
+            <a:spAutoFit/>
+          </a:bodyPr>
+          <a:lstStyle/>
+          <a:p>
+            <a:r>
+              <a:rPr lang="de-DE" sz="2800" dirty="0"/>
+              <a:t>Datei in Repository </a:t>
+            </a:r>
+          </a:p>
+          <a:p>
+            <a:r>
+              <a:rPr lang="de-DE" sz="2000" dirty="0"/>
+              <a:t>-abgerufen über Login</a:t>
+            </a:r>
+          </a:p>
+        </p:txBody>
+      </p:sp>
+      <p:cxnSp>
+        <p:nvCxnSpPr>
+          <p:cNvPr id="18" name="Gerade Verbindung mit Pfeil 17"/>
+          <p:cNvCxnSpPr/>
+          <p:nvPr/>
+        </p:nvCxnSpPr>
+        <p:spPr>
+          <a:xfrm>
+            <a:off x="2982006" y="5520389"/>
+            <a:ext cx="720080" cy="0"/>
+          </a:xfrm>
+          <a:prstGeom prst="straightConnector1">
+            <a:avLst/>
+          </a:prstGeom>
+          <a:ln>
+            <a:solidFill>
+              <a:schemeClr val="tx1"/>
+            </a:solidFill>
+            <a:tailEnd type="triangle"/>
+          </a:ln>
+        </p:spPr>
+        <p:style>
+          <a:lnRef idx="3">
+            <a:schemeClr val="accent1"/>
+          </a:lnRef>
+          <a:fillRef idx="0">
+            <a:schemeClr val="accent1"/>
+          </a:fillRef>
+          <a:effectRef idx="2">
+            <a:schemeClr val="accent1"/>
+          </a:effectRef>
+          <a:fontRef idx="minor">
+            <a:schemeClr val="tx1"/>
+          </a:fontRef>
+        </p:style>
+      </p:cxnSp>
+    </p:spTree>
+    <p:extLst>
+      <p:ext uri="{BB962C8B-B14F-4D97-AF65-F5344CB8AC3E}">
+        <p14:creationId xmlns:p14="http://schemas.microsoft.com/office/powerpoint/2010/main" val="1159979520"/>
+      </p:ext>
+    </p:extLst>
+  </p:cSld>
+  <p:clrMapOvr>
+    <a:masterClrMapping/>
+  </p:clrMapOvr>
+  <mc:AlternateContent xmlns:mc="http://schemas.openxmlformats.org/markup-compatibility/2006" xmlns:p14="http://schemas.microsoft.com/office/powerpoint/2010/main">
+    <mc:Choice Requires="p14">
+      <p:transition spd="med" p14:dur="700">
+        <p:fade/>
+      </p:transition>
+    </mc:Choice>
+    <mc:Fallback xmlns="">
+      <p:transition spd="med">
+        <p:fade/>
+      </p:transition>
+    </mc:Fallback>
+  </mc:AlternateContent>
+</p:sld>
+</file>
+
+<file path=ppt/slides/slide16.xml><?xml version="1.0" encoding="utf-8"?>
+<p:sld xmlns:a="http://schemas.openxmlformats.org/drawingml/2006/main" xmlns:r="http://schemas.openxmlformats.org/officeDocument/2006/relationships" xmlns:p="http://schemas.openxmlformats.org/presentationml/2006/main">
+  <p:cSld>
+    <p:spTree>
+      <p:nvGrpSpPr>
+        <p:cNvPr id="1" name=""/>
+        <p:cNvGrpSpPr/>
+        <p:nvPr/>
+      </p:nvGrpSpPr>
+      <p:grpSpPr>
+        <a:xfrm>
+          <a:off x="0" y="0"/>
+          <a:ext cx="0" cy="0"/>
+          <a:chOff x="0" y="0"/>
+          <a:chExt cx="0" cy="0"/>
+        </a:xfrm>
+      </p:grpSpPr>
+      <p:sp>
+        <p:nvSpPr>
+          <p:cNvPr id="7" name="Titel 6"/>
+          <p:cNvSpPr>
+            <a:spLocks noGrp="1"/>
+          </p:cNvSpPr>
+          <p:nvPr>
+            <p:ph type="title"/>
+          </p:nvPr>
+        </p:nvSpPr>
+        <p:spPr/>
+        <p:txBody>
+          <a:bodyPr/>
+          <a:lstStyle/>
+          <a:p>
+            <a:r>
+              <a:rPr lang="de-DE" dirty="0"/>
+              <a:t>Unterschiede der Tools</a:t>
+            </a:r>
+          </a:p>
+        </p:txBody>
+      </p:sp>
+      <p:sp>
+        <p:nvSpPr>
+          <p:cNvPr id="8" name="Textplatzhalter 7"/>
+          <p:cNvSpPr>
+            <a:spLocks noGrp="1"/>
+          </p:cNvSpPr>
+          <p:nvPr>
+            <p:ph type="body" idx="1"/>
+          </p:nvPr>
+        </p:nvSpPr>
+        <p:spPr/>
+        <p:txBody>
+          <a:bodyPr/>
+          <a:lstStyle/>
+          <a:p>
+            <a:pPr algn="ctr"/>
+            <a:r>
+              <a:rPr lang="de-DE" dirty="0"/>
+              <a:t>GitHub</a:t>
+            </a:r>
+          </a:p>
+        </p:txBody>
+      </p:sp>
+      <p:sp>
+        <p:nvSpPr>
+          <p:cNvPr id="9" name="Textplatzhalter 8"/>
+          <p:cNvSpPr>
+            <a:spLocks noGrp="1"/>
+          </p:cNvSpPr>
+          <p:nvPr>
+            <p:ph type="body" sz="quarter" idx="3"/>
+          </p:nvPr>
+        </p:nvSpPr>
+        <p:spPr/>
+        <p:txBody>
+          <a:bodyPr/>
+          <a:lstStyle/>
+          <a:p>
+            <a:pPr algn="ctr"/>
+            <a:r>
+              <a:rPr lang="de-DE" dirty="0"/>
+              <a:t>SVN</a:t>
+            </a:r>
+          </a:p>
+        </p:txBody>
+      </p:sp>
+      <p:sp>
+        <p:nvSpPr>
+          <p:cNvPr id="10" name="Inhaltsplatzhalter 9"/>
+          <p:cNvSpPr>
+            <a:spLocks noGrp="1"/>
+          </p:cNvSpPr>
+          <p:nvPr>
+            <p:ph sz="half" idx="2"/>
+          </p:nvPr>
+        </p:nvSpPr>
+        <p:spPr>
+          <a:xfrm>
+            <a:off x="1218883" y="2717800"/>
+            <a:ext cx="5082740" cy="3454400"/>
+          </a:xfrm>
+        </p:spPr>
+        <p:txBody>
+          <a:bodyPr/>
+          <a:lstStyle/>
+          <a:p>
+            <a:r>
+              <a:rPr lang="de-DE" sz="1800" dirty="0"/>
+              <a:t>Online, Kommandobox, Desktop Anwendung</a:t>
+            </a:r>
+          </a:p>
+          <a:p>
+            <a:r>
+              <a:rPr lang="de-DE" sz="1800" dirty="0"/>
+              <a:t>Hauptsächlich Online-Server</a:t>
+            </a:r>
+          </a:p>
+          <a:p>
+            <a:r>
+              <a:rPr lang="de-DE" sz="1800" dirty="0"/>
+              <a:t>User einladen in </a:t>
+            </a:r>
+            <a:r>
+              <a:rPr lang="de-DE" sz="1800" dirty="0" err="1"/>
+              <a:t>GitHub</a:t>
+            </a:r>
+            <a:r>
+              <a:rPr lang="de-DE" sz="1800" dirty="0"/>
+              <a:t>-Online</a:t>
+            </a:r>
+          </a:p>
+          <a:p>
+            <a:endParaRPr lang="de-DE" sz="1800" dirty="0"/>
+          </a:p>
+          <a:p>
+            <a:endParaRPr lang="de-DE" sz="1800" dirty="0"/>
+          </a:p>
+          <a:p>
+            <a:r>
+              <a:rPr lang="de-DE" sz="1800" dirty="0"/>
+              <a:t>Bedienung: Recht Intuitiv und einfach</a:t>
+            </a:r>
+          </a:p>
+          <a:p>
+            <a:endParaRPr lang="de-DE" dirty="0"/>
+          </a:p>
+        </p:txBody>
+      </p:sp>
+      <p:sp>
+        <p:nvSpPr>
+          <p:cNvPr id="11" name="Inhaltsplatzhalter 10"/>
+          <p:cNvSpPr>
+            <a:spLocks noGrp="1"/>
+          </p:cNvSpPr>
+          <p:nvPr>
+            <p:ph sz="quarter" idx="4"/>
+          </p:nvPr>
+        </p:nvSpPr>
+        <p:spPr>
+          <a:xfrm>
+            <a:off x="6500707" y="2717800"/>
+            <a:ext cx="5078677" cy="3454400"/>
+          </a:xfrm>
+        </p:spPr>
+        <p:txBody>
+          <a:bodyPr/>
+          <a:lstStyle/>
+          <a:p>
+            <a:r>
+              <a:rPr lang="de-DE" sz="1800" dirty="0"/>
+              <a:t>Per Verzeichnisstruktur</a:t>
+            </a:r>
+          </a:p>
+          <a:p>
+            <a:r>
+              <a:rPr lang="de-DE" sz="1800" dirty="0"/>
+              <a:t>Hauptsächlich Server auf eigenem PC</a:t>
+            </a:r>
+          </a:p>
+          <a:p>
+            <a:r>
+              <a:rPr lang="de-DE" sz="1800" dirty="0"/>
+              <a:t>Per URL-Erzeugung </a:t>
+            </a:r>
+          </a:p>
+          <a:p>
+            <a:r>
+              <a:rPr lang="de-DE" sz="1800" dirty="0"/>
+              <a:t>User Erstellung in </a:t>
+            </a:r>
+            <a:r>
+              <a:rPr lang="de-DE" sz="1800" dirty="0" err="1"/>
+              <a:t>VisualSVN</a:t>
+            </a:r>
+            <a:r>
+              <a:rPr lang="de-DE" sz="1800" dirty="0"/>
+              <a:t> Server</a:t>
+            </a:r>
+          </a:p>
+          <a:p>
+            <a:endParaRPr lang="de-DE" sz="1800" dirty="0"/>
+          </a:p>
+          <a:p>
+            <a:endParaRPr lang="de-DE" sz="1800" dirty="0"/>
+          </a:p>
+          <a:p>
+            <a:r>
+              <a:rPr lang="de-DE" sz="1800" dirty="0"/>
+              <a:t>Bedienung: nicht ganz so intuitiv, eher komplex</a:t>
+            </a:r>
+          </a:p>
+        </p:txBody>
+      </p:sp>
+    </p:spTree>
+    <p:extLst>
+      <p:ext uri="{BB962C8B-B14F-4D97-AF65-F5344CB8AC3E}">
+        <p14:creationId xmlns:p14="http://schemas.microsoft.com/office/powerpoint/2010/main" val="1491371497"/>
+      </p:ext>
+    </p:extLst>
+  </p:cSld>
+  <p:clrMapOvr>
+    <a:masterClrMapping/>
+  </p:clrMapOvr>
+  <mc:AlternateContent xmlns:mc="http://schemas.openxmlformats.org/markup-compatibility/2006" xmlns:p14="http://schemas.microsoft.com/office/powerpoint/2010/main">
+    <mc:Choice Requires="p14">
+      <p:transition spd="med" p14:dur="700">
+        <p:fade/>
+      </p:transition>
+    </mc:Choice>
+    <mc:Fallback xmlns="">
+      <p:transition spd="med">
+        <p:fade/>
+      </p:transition>
+    </mc:Fallback>
+  </mc:AlternateContent>
+</p:sld>
+</file>
+
+<file path=ppt/slides/slide17.xml><?xml version="1.0" encoding="utf-8"?>
+<p:sld xmlns:a="http://schemas.openxmlformats.org/drawingml/2006/main" xmlns:r="http://schemas.openxmlformats.org/officeDocument/2006/relationships" xmlns:p="http://schemas.openxmlformats.org/presentationml/2006/main">
+  <p:cSld>
+    <p:spTree>
+      <p:nvGrpSpPr>
+        <p:cNvPr id="1" name=""/>
+        <p:cNvGrpSpPr/>
+        <p:nvPr/>
+      </p:nvGrpSpPr>
+      <p:grpSpPr>
+        <a:xfrm>
+          <a:off x="0" y="0"/>
+          <a:ext cx="0" cy="0"/>
+          <a:chOff x="0" y="0"/>
+          <a:chExt cx="0" cy="0"/>
+        </a:xfrm>
+      </p:grpSpPr>
+      <p:sp>
+        <p:nvSpPr>
+          <p:cNvPr id="4" name="Titel 3"/>
+          <p:cNvSpPr>
+            <a:spLocks noGrp="1"/>
+          </p:cNvSpPr>
+          <p:nvPr>
+            <p:ph type="title"/>
+          </p:nvPr>
+        </p:nvSpPr>
+        <p:spPr/>
+        <p:txBody>
+          <a:bodyPr/>
+          <a:lstStyle/>
+          <a:p>
+            <a:r>
+              <a:rPr lang="de-DE" dirty="0"/>
+              <a:t>FAZIT</a:t>
+            </a:r>
+          </a:p>
+        </p:txBody>
+      </p:sp>
+      <p:sp>
+        <p:nvSpPr>
+          <p:cNvPr id="5" name="Textplatzhalter 4"/>
+          <p:cNvSpPr>
+            <a:spLocks noGrp="1"/>
+          </p:cNvSpPr>
+          <p:nvPr>
+            <p:ph type="body" idx="1"/>
+          </p:nvPr>
+        </p:nvSpPr>
+        <p:spPr/>
+        <p:txBody>
+          <a:bodyPr>
+            <a:normAutofit/>
+          </a:bodyPr>
+          <a:lstStyle/>
+          <a:p>
+            <a:r>
+              <a:rPr lang="de-DE" dirty="0"/>
+              <a:t>Welches </a:t>
+            </a:r>
+            <a:r>
+              <a:rPr lang="de-DE" dirty="0" err="1"/>
+              <a:t>tool</a:t>
+            </a:r>
+            <a:r>
+              <a:rPr lang="de-DE" dirty="0"/>
+              <a:t> ist besser</a:t>
+            </a:r>
+          </a:p>
+        </p:txBody>
+      </p:sp>
+      <p:sp>
+        <p:nvSpPr>
+          <p:cNvPr id="2" name="Textfeld 1"/>
+          <p:cNvSpPr txBox="1"/>
+          <p:nvPr/>
+        </p:nvSpPr>
+        <p:spPr>
+          <a:xfrm>
+            <a:off x="7174532" y="38809"/>
+            <a:ext cx="2664296" cy="5478423"/>
+          </a:xfrm>
+          <a:prstGeom prst="rect">
+            <a:avLst/>
+          </a:prstGeom>
+          <a:noFill/>
+        </p:spPr>
+        <p:txBody>
+          <a:bodyPr wrap="square" rtlCol="0">
+            <a:spAutoFit/>
+          </a:bodyPr>
+          <a:lstStyle/>
+          <a:p>
+            <a:r>
+              <a:rPr lang="de-DE" sz="35000">
+                <a:latin typeface="Century Schoolbook" panose="02040604050505020304" pitchFamily="18" charset="0"/>
+              </a:rPr>
+              <a:t>?</a:t>
+            </a:r>
+          </a:p>
+        </p:txBody>
+      </p:sp>
+    </p:spTree>
+    <p:extLst>
+      <p:ext uri="{BB962C8B-B14F-4D97-AF65-F5344CB8AC3E}">
+        <p14:creationId xmlns:p14="http://schemas.microsoft.com/office/powerpoint/2010/main" val="1242439787"/>
+      </p:ext>
+    </p:extLst>
+  </p:cSld>
+  <p:clrMapOvr>
+    <a:masterClrMapping/>
+  </p:clrMapOvr>
+  <mc:AlternateContent xmlns:mc="http://schemas.openxmlformats.org/markup-compatibility/2006" xmlns:p14="http://schemas.microsoft.com/office/powerpoint/2010/main">
+    <mc:Choice Requires="p14">
+      <p:transition spd="med" p14:dur="700">
+        <p:fade/>
+      </p:transition>
+    </mc:Choice>
+    <mc:Fallback xmlns="">
+      <p:transition spd="med">
+        <p:fade/>
+      </p:transition>
+    </mc:Fallback>
+  </mc:AlternateContent>
+</p:sld>
+</file>
+
+<file path=ppt/slides/slide18.xml><?xml version="1.0" encoding="utf-8"?>
+<p:sld xmlns:a="http://schemas.openxmlformats.org/drawingml/2006/main" xmlns:r="http://schemas.openxmlformats.org/officeDocument/2006/relationships" xmlns:p="http://schemas.openxmlformats.org/presentationml/2006/main">
+  <p:cSld>
+    <p:spTree>
+      <p:nvGrpSpPr>
+        <p:cNvPr id="1" name=""/>
+        <p:cNvGrpSpPr/>
+        <p:nvPr/>
+      </p:nvGrpSpPr>
+      <p:grpSpPr>
+        <a:xfrm>
+          <a:off x="0" y="0"/>
+          <a:ext cx="0" cy="0"/>
+          <a:chOff x="0" y="0"/>
+          <a:chExt cx="0" cy="0"/>
+        </a:xfrm>
+      </p:grpSpPr>
+      <p:sp>
+        <p:nvSpPr>
+          <p:cNvPr id="2" name="Titel 1"/>
+          <p:cNvSpPr>
+            <a:spLocks noGrp="1"/>
+          </p:cNvSpPr>
+          <p:nvPr>
+            <p:ph type="title"/>
+          </p:nvPr>
+        </p:nvSpPr>
         <p:spPr/>
         <p:txBody>
           <a:bodyPr/>
@@ -6076,7 +7015,7 @@
 </p:sld>
 </file>
 
-<file path=ppt/slides/slide16.xml><?xml version="1.0" encoding="utf-8"?>
+<file path=ppt/slides/slide19.xml><?xml version="1.0" encoding="utf-8"?>
 <p:sld xmlns:a="http://schemas.openxmlformats.org/drawingml/2006/main" xmlns:r="http://schemas.openxmlformats.org/officeDocument/2006/relationships" xmlns:p="http://schemas.openxmlformats.org/presentationml/2006/main">
   <p:cSld>
     <p:spTree>
@@ -6692,7 +7631,11 @@
             </a:r>
           </a:p>
           <a:p>
-            <a:endParaRPr lang="de-DE" dirty="0"/>
+            <a:pPr lvl="1"/>
+            <a:r>
+              <a:rPr lang="de-DE" dirty="0"/>
+              <a:t>Beispiel: datei_finale_version_5_2.doc</a:t>
+            </a:r>
           </a:p>
           <a:p>
             <a:r>
@@ -7052,18 +7995,27 @@
         </p:nvSpPr>
         <p:spPr>
           <a:xfrm>
-            <a:off x="1218883" y="1844824"/>
-            <a:ext cx="6315690" cy="4462272"/>
+            <a:off x="1218882" y="1844824"/>
+            <a:ext cx="8547937" cy="4462272"/>
           </a:xfrm>
         </p:spPr>
         <p:txBody>
           <a:bodyPr>
-            <a:normAutofit/>
+            <a:normAutofit lnSpcReduction="10000"/>
           </a:bodyPr>
           <a:lstStyle/>
           <a:p>
             <a:r>
               <a:rPr lang="de-DE" dirty="0"/>
+              <a:t>Mächtiges Werkzeug zur Verwaltung von Dateien</a:t>
+            </a:r>
+          </a:p>
+          <a:p>
+            <a:endParaRPr lang="de-DE" dirty="0"/>
+          </a:p>
+          <a:p>
+            <a:r>
+              <a:rPr lang="de-DE" dirty="0"/>
               <a:t>3 Systeme</a:t>
             </a:r>
           </a:p>
@@ -7089,7 +8041,7 @@
             </a:r>
           </a:p>
           <a:p>
-            <a:pPr marL="377886" lvl="1" indent="0">
+            <a:pPr marL="0" indent="0">
               <a:buNone/>
             </a:pPr>
             <a:endParaRPr lang="de-DE" dirty="0"/>
@@ -7097,16 +8049,14 @@
           <a:p>
             <a:r>
               <a:rPr lang="de-DE" dirty="0"/>
-              <a:t>Mächtiges Werkzeug zur Verwaltung von Dateien</a:t>
-            </a:r>
-          </a:p>
-          <a:p>
-            <a:endParaRPr lang="de-DE" dirty="0"/>
-          </a:p>
-          <a:p>
+              <a:t>Team &amp; Organisationsverwaltung online möglich</a:t>
+            </a:r>
+          </a:p>
+          <a:p>
+            <a:pPr lvl="1"/>
             <a:r>
               <a:rPr lang="de-DE" dirty="0"/>
-              <a:t>……..</a:t>
+              <a:t>Rechtezuteilung</a:t>
             </a:r>
           </a:p>
         </p:txBody>

</xml_diff>